<commit_message>
Updated Block Diagram with Ownership. --Spencer.
</commit_message>
<xml_diff>
--- a/block_diagram.pptx
+++ b/block_diagram.pptx
@@ -3320,7 +3320,15 @@
             <a:pPr algn="ctr"/>
             <a:r>
               <a:rPr lang="en-US" dirty="0" smtClean="0"/>
-              <a:t>Monomial ordering from partition info</a:t>
+              <a:t>Monomial ordering/</a:t>
+            </a:r>
+            <a:r>
+              <a:rPr lang="en-US" dirty="0" err="1" smtClean="0"/>
+              <a:t>Grobner</a:t>
+            </a:r>
+            <a:r>
+              <a:rPr lang="en-US" dirty="0" smtClean="0"/>
+              <a:t> from partition info</a:t>
             </a:r>
             <a:endParaRPr lang="en-US" dirty="0"/>
           </a:p>
@@ -3663,6 +3671,165 @@
           </a:fontRef>
         </p:style>
       </p:cxnSp>
+      <p:sp>
+        <p:nvSpPr>
+          <p:cNvPr id="23" name="Rectangle 22"/>
+          <p:cNvSpPr/>
+          <p:nvPr/>
+        </p:nvSpPr>
+        <p:spPr>
+          <a:xfrm>
+            <a:off x="304800" y="152400"/>
+            <a:ext cx="7543800" cy="2209800"/>
+          </a:xfrm>
+          <a:prstGeom prst="rect">
+            <a:avLst/>
+          </a:prstGeom>
+          <a:noFill/>
+        </p:spPr>
+        <p:style>
+          <a:lnRef idx="2">
+            <a:schemeClr val="accent1">
+              <a:shade val="50000"/>
+            </a:schemeClr>
+          </a:lnRef>
+          <a:fillRef idx="1">
+            <a:schemeClr val="accent1"/>
+          </a:fillRef>
+          <a:effectRef idx="0">
+            <a:schemeClr val="accent1"/>
+          </a:effectRef>
+          <a:fontRef idx="minor">
+            <a:schemeClr val="lt1"/>
+          </a:fontRef>
+        </p:style>
+        <p:txBody>
+          <a:bodyPr rtlCol="0" anchor="b" anchorCtr="0"/>
+          <a:lstStyle/>
+          <a:p>
+            <a:pPr algn="ctr"/>
+            <a:r>
+              <a:rPr lang="en-US" dirty="0" smtClean="0">
+                <a:solidFill>
+                  <a:schemeClr val="tx1"/>
+                </a:solidFill>
+              </a:rPr>
+              <a:t>Drew (Perl)</a:t>
+            </a:r>
+            <a:endParaRPr lang="en-US" dirty="0">
+              <a:solidFill>
+                <a:schemeClr val="tx1"/>
+              </a:solidFill>
+            </a:endParaRPr>
+          </a:p>
+        </p:txBody>
+      </p:sp>
+      <p:sp>
+        <p:nvSpPr>
+          <p:cNvPr id="24" name="Rectangle 23"/>
+          <p:cNvSpPr/>
+          <p:nvPr/>
+        </p:nvSpPr>
+        <p:spPr>
+          <a:xfrm>
+            <a:off x="228600" y="3299388"/>
+            <a:ext cx="2362200" cy="2209801"/>
+          </a:xfrm>
+          <a:prstGeom prst="rect">
+            <a:avLst/>
+          </a:prstGeom>
+          <a:noFill/>
+        </p:spPr>
+        <p:style>
+          <a:lnRef idx="2">
+            <a:schemeClr val="accent1">
+              <a:shade val="50000"/>
+            </a:schemeClr>
+          </a:lnRef>
+          <a:fillRef idx="1">
+            <a:schemeClr val="accent1"/>
+          </a:fillRef>
+          <a:effectRef idx="0">
+            <a:schemeClr val="accent1"/>
+          </a:effectRef>
+          <a:fontRef idx="minor">
+            <a:schemeClr val="lt1"/>
+          </a:fontRef>
+        </p:style>
+        <p:txBody>
+          <a:bodyPr rtlCol="0" anchor="b" anchorCtr="0"/>
+          <a:lstStyle/>
+          <a:p>
+            <a:pPr algn="ctr"/>
+            <a:r>
+              <a:rPr lang="en-US" dirty="0" smtClean="0">
+                <a:solidFill>
+                  <a:schemeClr val="tx1"/>
+                </a:solidFill>
+              </a:rPr>
+              <a:t>Matt (Singular)</a:t>
+            </a:r>
+            <a:endParaRPr lang="en-US" dirty="0">
+              <a:solidFill>
+                <a:schemeClr val="tx1"/>
+              </a:solidFill>
+            </a:endParaRPr>
+          </a:p>
+        </p:txBody>
+      </p:sp>
+      <p:sp>
+        <p:nvSpPr>
+          <p:cNvPr id="25" name="Rectangle 24"/>
+          <p:cNvSpPr/>
+          <p:nvPr/>
+        </p:nvSpPr>
+        <p:spPr>
+          <a:xfrm>
+            <a:off x="2637446" y="3299389"/>
+            <a:ext cx="3915754" cy="2209800"/>
+          </a:xfrm>
+          <a:prstGeom prst="rect">
+            <a:avLst/>
+          </a:prstGeom>
+          <a:noFill/>
+        </p:spPr>
+        <p:style>
+          <a:lnRef idx="2">
+            <a:schemeClr val="accent1">
+              <a:shade val="50000"/>
+            </a:schemeClr>
+          </a:lnRef>
+          <a:fillRef idx="1">
+            <a:schemeClr val="accent1"/>
+          </a:fillRef>
+          <a:effectRef idx="0">
+            <a:schemeClr val="accent1"/>
+          </a:effectRef>
+          <a:fontRef idx="minor">
+            <a:schemeClr val="lt1"/>
+          </a:fontRef>
+        </p:style>
+        <p:txBody>
+          <a:bodyPr rtlCol="0" anchor="b" anchorCtr="0"/>
+          <a:lstStyle/>
+          <a:p>
+            <a:pPr algn="ctr"/>
+            <a:r>
+              <a:rPr lang="en-US" dirty="0" smtClean="0">
+                <a:solidFill>
+                  <a:schemeClr val="tx1"/>
+                </a:solidFill>
+              </a:rPr>
+              <a:t>Spencer(Perl)</a:t>
+            </a:r>
+            <a:endParaRPr lang="en-US" dirty="0">
+              <a:solidFill>
+                <a:schemeClr val="tx1"/>
+              </a:solidFill>
+            </a:endParaRPr>
+          </a:p>
+        </p:txBody>
+      </p:sp>
     </p:spTree>
     <p:extLst>
       <p:ext uri="{BB962C8B-B14F-4D97-AF65-F5344CB8AC3E}">

</xml_diff>

<commit_message>
updating hmetis script. --Spencer
</commit_message>
<xml_diff>
--- a/block_diagram.pptx
+++ b/block_diagram.pptx
@@ -288,7 +288,7 @@
           <a:p>
             <a:fld id="{A38D8561-5ABD-4424-B22C-1599553D55A2}" type="datetimeFigureOut">
               <a:rPr lang="en-US" smtClean="0"/>
-              <a:t>12/3/2014</a:t>
+              <a:t>12/17/2014</a:t>
             </a:fld>
             <a:endParaRPr lang="en-US"/>
           </a:p>
@@ -458,7 +458,7 @@
           <a:p>
             <a:fld id="{A38D8561-5ABD-4424-B22C-1599553D55A2}" type="datetimeFigureOut">
               <a:rPr lang="en-US" smtClean="0"/>
-              <a:t>12/3/2014</a:t>
+              <a:t>12/17/2014</a:t>
             </a:fld>
             <a:endParaRPr lang="en-US"/>
           </a:p>
@@ -638,7 +638,7 @@
           <a:p>
             <a:fld id="{A38D8561-5ABD-4424-B22C-1599553D55A2}" type="datetimeFigureOut">
               <a:rPr lang="en-US" smtClean="0"/>
-              <a:t>12/3/2014</a:t>
+              <a:t>12/17/2014</a:t>
             </a:fld>
             <a:endParaRPr lang="en-US"/>
           </a:p>
@@ -808,7 +808,7 @@
           <a:p>
             <a:fld id="{A38D8561-5ABD-4424-B22C-1599553D55A2}" type="datetimeFigureOut">
               <a:rPr lang="en-US" smtClean="0"/>
-              <a:t>12/3/2014</a:t>
+              <a:t>12/17/2014</a:t>
             </a:fld>
             <a:endParaRPr lang="en-US"/>
           </a:p>
@@ -1054,7 +1054,7 @@
           <a:p>
             <a:fld id="{A38D8561-5ABD-4424-B22C-1599553D55A2}" type="datetimeFigureOut">
               <a:rPr lang="en-US" smtClean="0"/>
-              <a:t>12/3/2014</a:t>
+              <a:t>12/17/2014</a:t>
             </a:fld>
             <a:endParaRPr lang="en-US"/>
           </a:p>
@@ -1342,7 +1342,7 @@
           <a:p>
             <a:fld id="{A38D8561-5ABD-4424-B22C-1599553D55A2}" type="datetimeFigureOut">
               <a:rPr lang="en-US" smtClean="0"/>
-              <a:t>12/3/2014</a:t>
+              <a:t>12/17/2014</a:t>
             </a:fld>
             <a:endParaRPr lang="en-US"/>
           </a:p>
@@ -1764,7 +1764,7 @@
           <a:p>
             <a:fld id="{A38D8561-5ABD-4424-B22C-1599553D55A2}" type="datetimeFigureOut">
               <a:rPr lang="en-US" smtClean="0"/>
-              <a:t>12/3/2014</a:t>
+              <a:t>12/17/2014</a:t>
             </a:fld>
             <a:endParaRPr lang="en-US"/>
           </a:p>
@@ -1882,7 +1882,7 @@
           <a:p>
             <a:fld id="{A38D8561-5ABD-4424-B22C-1599553D55A2}" type="datetimeFigureOut">
               <a:rPr lang="en-US" smtClean="0"/>
-              <a:t>12/3/2014</a:t>
+              <a:t>12/17/2014</a:t>
             </a:fld>
             <a:endParaRPr lang="en-US"/>
           </a:p>
@@ -1977,7 +1977,7 @@
           <a:p>
             <a:fld id="{A38D8561-5ABD-4424-B22C-1599553D55A2}" type="datetimeFigureOut">
               <a:rPr lang="en-US" smtClean="0"/>
-              <a:t>12/3/2014</a:t>
+              <a:t>12/17/2014</a:t>
             </a:fld>
             <a:endParaRPr lang="en-US"/>
           </a:p>
@@ -2254,7 +2254,7 @@
           <a:p>
             <a:fld id="{A38D8561-5ABD-4424-B22C-1599553D55A2}" type="datetimeFigureOut">
               <a:rPr lang="en-US" smtClean="0"/>
-              <a:t>12/3/2014</a:t>
+              <a:t>12/17/2014</a:t>
             </a:fld>
             <a:endParaRPr lang="en-US"/>
           </a:p>
@@ -2507,7 +2507,7 @@
           <a:p>
             <a:fld id="{A38D8561-5ABD-4424-B22C-1599553D55A2}" type="datetimeFigureOut">
               <a:rPr lang="en-US" smtClean="0"/>
-              <a:t>12/3/2014</a:t>
+              <a:t>12/17/2014</a:t>
             </a:fld>
             <a:endParaRPr lang="en-US"/>
           </a:p>
@@ -2720,7 +2720,7 @@
           <a:p>
             <a:fld id="{A38D8561-5ABD-4424-B22C-1599553D55A2}" type="datetimeFigureOut">
               <a:rPr lang="en-US" smtClean="0"/>
-              <a:t>12/3/2014</a:t>
+              <a:t>12/17/2014</a:t>
             </a:fld>
             <a:endParaRPr lang="en-US"/>
           </a:p>
@@ -3265,11 +3265,7 @@
             <a:pPr algn="ctr"/>
             <a:r>
               <a:rPr lang="en-US" dirty="0" smtClean="0"/>
-              <a:t>Graph to </a:t>
-            </a:r>
-            <a:r>
-              <a:rPr lang="en-US" dirty="0" smtClean="0"/>
-              <a:t>Polys over Z</a:t>
+              <a:t>Graph to Polys over Z</a:t>
             </a:r>
             <a:r>
               <a:rPr lang="en-US" baseline="-25000" dirty="0" smtClean="0"/>
@@ -3517,46 +3513,6 @@
       </p:sp>
       <p:sp>
         <p:nvSpPr>
-          <p:cNvPr id="17" name="Right Arrow 16"/>
-          <p:cNvSpPr/>
-          <p:nvPr/>
-        </p:nvSpPr>
-        <p:spPr>
-          <a:xfrm>
-            <a:off x="1905000" y="4084320"/>
-            <a:ext cx="685800" cy="457200"/>
-          </a:xfrm>
-          <a:prstGeom prst="rightArrow">
-            <a:avLst/>
-          </a:prstGeom>
-        </p:spPr>
-        <p:style>
-          <a:lnRef idx="2">
-            <a:schemeClr val="accent1">
-              <a:shade val="50000"/>
-            </a:schemeClr>
-          </a:lnRef>
-          <a:fillRef idx="1">
-            <a:schemeClr val="accent1"/>
-          </a:fillRef>
-          <a:effectRef idx="0">
-            <a:schemeClr val="accent1"/>
-          </a:effectRef>
-          <a:fontRef idx="minor">
-            <a:schemeClr val="lt1"/>
-          </a:fontRef>
-        </p:style>
-        <p:txBody>
-          <a:bodyPr rtlCol="0" anchor="ctr"/>
-          <a:lstStyle/>
-          <a:p>
-            <a:pPr algn="ctr"/>
-            <a:endParaRPr lang="en-US"/>
-          </a:p>
-        </p:txBody>
-      </p:sp>
-      <p:sp>
-        <p:nvSpPr>
           <p:cNvPr id="18" name="Right Arrow 17"/>
           <p:cNvSpPr/>
           <p:nvPr/>
@@ -3635,42 +3591,6 @@
           </a:p>
         </p:txBody>
       </p:sp>
-      <p:cxnSp>
-        <p:nvCxnSpPr>
-          <p:cNvPr id="21" name="Elbow Connector 20"/>
-          <p:cNvCxnSpPr>
-            <a:stCxn id="9" idx="2"/>
-            <a:endCxn id="10" idx="0"/>
-          </p:cNvCxnSpPr>
-          <p:nvPr/>
-        </p:nvCxnSpPr>
-        <p:spPr>
-          <a:xfrm rot="5400000">
-            <a:off x="2599845" y="466244"/>
-            <a:ext cx="1658311" cy="4572000"/>
-          </a:xfrm>
-          <a:prstGeom prst="bentConnector3">
-            <a:avLst/>
-          </a:prstGeom>
-          <a:ln w="101600">
-            <a:tailEnd type="arrow"/>
-          </a:ln>
-        </p:spPr>
-        <p:style>
-          <a:lnRef idx="1">
-            <a:schemeClr val="accent1"/>
-          </a:lnRef>
-          <a:fillRef idx="0">
-            <a:schemeClr val="accent1"/>
-          </a:fillRef>
-          <a:effectRef idx="0">
-            <a:schemeClr val="accent1"/>
-          </a:effectRef>
-          <a:fontRef idx="minor">
-            <a:schemeClr val="tx1"/>
-          </a:fontRef>
-        </p:style>
-      </p:cxnSp>
       <p:sp>
         <p:nvSpPr>
           <p:cNvPr id="23" name="Rectangle 22"/>
@@ -3680,7 +3600,7 @@
         <p:spPr>
           <a:xfrm>
             <a:off x="304800" y="152400"/>
-            <a:ext cx="7543800" cy="2209800"/>
+            <a:ext cx="8534400" cy="2209800"/>
           </a:xfrm>
           <a:prstGeom prst="rect">
             <a:avLst/>
@@ -3714,7 +3634,15 @@
                   <a:schemeClr val="tx1"/>
                 </a:solidFill>
               </a:rPr>
-              <a:t>Drew (Perl)</a:t>
+              <a:t> </a:t>
+            </a:r>
+            <a:r>
+              <a:rPr lang="en-US" dirty="0" smtClean="0">
+                <a:solidFill>
+                  <a:schemeClr val="tx1"/>
+                </a:solidFill>
+              </a:rPr>
+              <a:t>(Perl)</a:t>
             </a:r>
             <a:endParaRPr lang="en-US" dirty="0">
               <a:solidFill>
@@ -3767,7 +3695,15 @@
                   <a:schemeClr val="tx1"/>
                 </a:solidFill>
               </a:rPr>
-              <a:t>Matt (Singular)</a:t>
+              <a:t>(Singular</a:t>
+            </a:r>
+            <a:r>
+              <a:rPr lang="en-US" dirty="0" smtClean="0">
+                <a:solidFill>
+                  <a:schemeClr val="tx1"/>
+                </a:solidFill>
+              </a:rPr>
+              <a:t>)</a:t>
             </a:r>
             <a:endParaRPr lang="en-US" dirty="0">
               <a:solidFill>
@@ -3820,13 +3756,177 @@
                   <a:schemeClr val="tx1"/>
                 </a:solidFill>
               </a:rPr>
-              <a:t>Spencer(Perl)</a:t>
+              <a:t>(Perl/Bash)</a:t>
             </a:r>
             <a:endParaRPr lang="en-US" dirty="0">
               <a:solidFill>
                 <a:schemeClr val="tx1"/>
               </a:solidFill>
             </a:endParaRPr>
+          </a:p>
+        </p:txBody>
+      </p:sp>
+      <p:sp>
+        <p:nvSpPr>
+          <p:cNvPr id="20" name="Rectangle 19"/>
+          <p:cNvSpPr/>
+          <p:nvPr/>
+        </p:nvSpPr>
+        <p:spPr>
+          <a:xfrm>
+            <a:off x="7315200" y="476002"/>
+            <a:ext cx="1371600" cy="1463040"/>
+          </a:xfrm>
+          <a:prstGeom prst="rect">
+            <a:avLst/>
+          </a:prstGeom>
+        </p:spPr>
+        <p:style>
+          <a:lnRef idx="2">
+            <a:schemeClr val="accent1">
+              <a:shade val="50000"/>
+            </a:schemeClr>
+          </a:lnRef>
+          <a:fillRef idx="1">
+            <a:schemeClr val="accent1"/>
+          </a:fillRef>
+          <a:effectRef idx="0">
+            <a:schemeClr val="accent1"/>
+          </a:effectRef>
+          <a:fontRef idx="minor">
+            <a:schemeClr val="lt1"/>
+          </a:fontRef>
+        </p:style>
+        <p:txBody>
+          <a:bodyPr rtlCol="0" anchor="ctr"/>
+          <a:lstStyle/>
+          <a:p>
+            <a:pPr algn="ctr"/>
+            <a:r>
+              <a:rPr lang="en-US" dirty="0" smtClean="0"/>
+              <a:t>Partition in </a:t>
+            </a:r>
+            <a:r>
+              <a:rPr lang="en-US" dirty="0" err="1" smtClean="0"/>
+              <a:t>Hmetis</a:t>
+            </a:r>
+            <a:endParaRPr lang="en-US" dirty="0"/>
+          </a:p>
+        </p:txBody>
+      </p:sp>
+      <p:sp>
+        <p:nvSpPr>
+          <p:cNvPr id="22" name="Right Arrow 21"/>
+          <p:cNvSpPr/>
+          <p:nvPr/>
+        </p:nvSpPr>
+        <p:spPr>
+          <a:xfrm>
+            <a:off x="6519729" y="914400"/>
+            <a:ext cx="685800" cy="457200"/>
+          </a:xfrm>
+          <a:prstGeom prst="rightArrow">
+            <a:avLst/>
+          </a:prstGeom>
+        </p:spPr>
+        <p:style>
+          <a:lnRef idx="2">
+            <a:schemeClr val="accent1">
+              <a:shade val="50000"/>
+            </a:schemeClr>
+          </a:lnRef>
+          <a:fillRef idx="1">
+            <a:schemeClr val="accent1"/>
+          </a:fillRef>
+          <a:effectRef idx="0">
+            <a:schemeClr val="accent1"/>
+          </a:effectRef>
+          <a:fontRef idx="minor">
+            <a:schemeClr val="lt1"/>
+          </a:fontRef>
+        </p:style>
+        <p:txBody>
+          <a:bodyPr rtlCol="0" anchor="ctr"/>
+          <a:lstStyle/>
+          <a:p>
+            <a:pPr algn="ctr"/>
+            <a:endParaRPr lang="en-US"/>
+          </a:p>
+        </p:txBody>
+      </p:sp>
+      <p:cxnSp>
+        <p:nvCxnSpPr>
+          <p:cNvPr id="21" name="Elbow Connector 20"/>
+          <p:cNvCxnSpPr>
+            <a:stCxn id="20" idx="2"/>
+            <a:endCxn id="10" idx="0"/>
+          </p:cNvCxnSpPr>
+          <p:nvPr/>
+        </p:nvCxnSpPr>
+        <p:spPr>
+          <a:xfrm rot="5400000">
+            <a:off x="3750821" y="-668779"/>
+            <a:ext cx="1642358" cy="6858000"/>
+          </a:xfrm>
+          <a:prstGeom prst="bentConnector3">
+            <a:avLst/>
+          </a:prstGeom>
+          <a:ln w="101600">
+            <a:tailEnd type="arrow"/>
+          </a:ln>
+        </p:spPr>
+        <p:style>
+          <a:lnRef idx="1">
+            <a:schemeClr val="accent1"/>
+          </a:lnRef>
+          <a:fillRef idx="0">
+            <a:schemeClr val="accent1"/>
+          </a:fillRef>
+          <a:effectRef idx="0">
+            <a:schemeClr val="accent1"/>
+          </a:effectRef>
+          <a:fontRef idx="minor">
+            <a:schemeClr val="tx1"/>
+          </a:fontRef>
+        </p:style>
+      </p:cxnSp>
+      <p:sp>
+        <p:nvSpPr>
+          <p:cNvPr id="17" name="Right Arrow 16"/>
+          <p:cNvSpPr/>
+          <p:nvPr/>
+        </p:nvSpPr>
+        <p:spPr>
+          <a:xfrm>
+            <a:off x="1905000" y="4084320"/>
+            <a:ext cx="685800" cy="457200"/>
+          </a:xfrm>
+          <a:prstGeom prst="rightArrow">
+            <a:avLst/>
+          </a:prstGeom>
+        </p:spPr>
+        <p:style>
+          <a:lnRef idx="2">
+            <a:schemeClr val="accent1">
+              <a:shade val="50000"/>
+            </a:schemeClr>
+          </a:lnRef>
+          <a:fillRef idx="1">
+            <a:schemeClr val="accent1"/>
+          </a:fillRef>
+          <a:effectRef idx="0">
+            <a:schemeClr val="accent1"/>
+          </a:effectRef>
+          <a:fontRef idx="minor">
+            <a:schemeClr val="lt1"/>
+          </a:fontRef>
+        </p:style>
+        <p:txBody>
+          <a:bodyPr rtlCol="0" anchor="ctr"/>
+          <a:lstStyle/>
+          <a:p>
+            <a:pPr algn="ctr"/>
+            <a:endParaRPr lang="en-US"/>
           </a:p>
         </p:txBody>
       </p:sp>

</xml_diff>